<commit_message>
Introduction to Types and Variables lecture update
</commit_message>
<xml_diff>
--- a/01_02IntroductionTypes_VariablesCS152.pptx
+++ b/01_02IntroductionTypes_VariablesCS152.pptx
@@ -278,965 +278,29 @@
 <pc:chgInfo xmlns:a="http://schemas.openxmlformats.org/drawingml/2006/main" xmlns:r="http://schemas.openxmlformats.org/officeDocument/2006/relationships" xmlns:ac="http://schemas.microsoft.com/office/drawing/2013/main/command" xmlns:pc="http://schemas.microsoft.com/office/powerpoint/2013/main/command">
   <pc:docChgLst>
     <pc:chgData name="Marcia Moraes" userId="c9c67e8a-58e2-4733-9a1c-5d44fec4775b" providerId="ADAL" clId="{13EBC211-F23B-468A-BCCD-307C1181F47D}"/>
-    <pc:docChg chg="undo custSel addSld delSld modSld">
-      <pc:chgData name="Marcia Moraes" userId="c9c67e8a-58e2-4733-9a1c-5d44fec4775b" providerId="ADAL" clId="{13EBC211-F23B-468A-BCCD-307C1181F47D}" dt="2022-08-05T02:40:16.720" v="2660" actId="20577"/>
+  </pc:docChgLst>
+  <pc:docChgLst>
+    <pc:chgData name="Marcia Moraes" userId="c9c67e8a-58e2-4733-9a1c-5d44fec4775b" providerId="ADAL" clId="{892381FB-0338-431E-AA1B-EA41B390EDFC}"/>
+    <pc:docChg chg="modSld">
+      <pc:chgData name="Marcia Moraes" userId="c9c67e8a-58e2-4733-9a1c-5d44fec4775b" providerId="ADAL" clId="{892381FB-0338-431E-AA1B-EA41B390EDFC}" dt="2024-06-03T21:34:55.686" v="1" actId="6549"/>
       <pc:docMkLst>
         <pc:docMk/>
       </pc:docMkLst>
       <pc:sldChg chg="modSp">
-        <pc:chgData name="Marcia Moraes" userId="c9c67e8a-58e2-4733-9a1c-5d44fec4775b" providerId="ADAL" clId="{13EBC211-F23B-468A-BCCD-307C1181F47D}" dt="2022-08-04T23:31:28.111" v="275" actId="20577"/>
-        <pc:sldMkLst>
-          <pc:docMk/>
-          <pc:sldMk cId="0" sldId="256"/>
-        </pc:sldMkLst>
-        <pc:spChg chg="mod">
-          <ac:chgData name="Marcia Moraes" userId="c9c67e8a-58e2-4733-9a1c-5d44fec4775b" providerId="ADAL" clId="{13EBC211-F23B-468A-BCCD-307C1181F47D}" dt="2022-08-04T23:10:08.270" v="60" actId="20577"/>
-          <ac:spMkLst>
-            <pc:docMk/>
-            <pc:sldMk cId="0" sldId="256"/>
-            <ac:spMk id="185" creationId="{00000000-0000-0000-0000-000000000000}"/>
-          </ac:spMkLst>
-        </pc:spChg>
-        <pc:spChg chg="mod">
-          <ac:chgData name="Marcia Moraes" userId="c9c67e8a-58e2-4733-9a1c-5d44fec4775b" providerId="ADAL" clId="{13EBC211-F23B-468A-BCCD-307C1181F47D}" dt="2022-08-04T23:31:28.111" v="275" actId="20577"/>
-          <ac:spMkLst>
-            <pc:docMk/>
-            <pc:sldMk cId="0" sldId="256"/>
-            <ac:spMk id="187" creationId="{00000000-0000-0000-0000-000000000000}"/>
-          </ac:spMkLst>
-        </pc:spChg>
-      </pc:sldChg>
-      <pc:sldChg chg="addSp delSp modSp delAnim">
-        <pc:chgData name="Marcia Moraes" userId="c9c67e8a-58e2-4733-9a1c-5d44fec4775b" providerId="ADAL" clId="{13EBC211-F23B-468A-BCCD-307C1181F47D}" dt="2022-08-04T23:43:37.611" v="405" actId="20577"/>
-        <pc:sldMkLst>
-          <pc:docMk/>
-          <pc:sldMk cId="0" sldId="258"/>
-        </pc:sldMkLst>
-        <pc:spChg chg="del">
-          <ac:chgData name="Marcia Moraes" userId="c9c67e8a-58e2-4733-9a1c-5d44fec4775b" providerId="ADAL" clId="{13EBC211-F23B-468A-BCCD-307C1181F47D}" dt="2022-08-04T23:26:38.136" v="244" actId="478"/>
-          <ac:spMkLst>
-            <pc:docMk/>
-            <pc:sldMk cId="0" sldId="258"/>
-            <ac:spMk id="2" creationId="{C17C6F2A-F7A2-41BB-825E-4A7C207AB846}"/>
-          </ac:spMkLst>
-        </pc:spChg>
-        <pc:spChg chg="add mod">
-          <ac:chgData name="Marcia Moraes" userId="c9c67e8a-58e2-4733-9a1c-5d44fec4775b" providerId="ADAL" clId="{13EBC211-F23B-468A-BCCD-307C1181F47D}" dt="2022-08-04T23:43:37.611" v="405" actId="20577"/>
-          <ac:spMkLst>
-            <pc:docMk/>
-            <pc:sldMk cId="0" sldId="258"/>
-            <ac:spMk id="4" creationId="{2EB05BED-1B0F-4746-9217-82286F1D5C69}"/>
-          </ac:spMkLst>
-        </pc:spChg>
-        <pc:spChg chg="add mod">
-          <ac:chgData name="Marcia Moraes" userId="c9c67e8a-58e2-4733-9a1c-5d44fec4775b" providerId="ADAL" clId="{13EBC211-F23B-468A-BCCD-307C1181F47D}" dt="2022-08-04T23:38:50.756" v="327" actId="20577"/>
-          <ac:spMkLst>
-            <pc:docMk/>
-            <pc:sldMk cId="0" sldId="258"/>
-            <ac:spMk id="5" creationId="{E6B211F7-F11C-4B24-BE87-07B6C42B9691}"/>
-          </ac:spMkLst>
-        </pc:spChg>
-        <pc:spChg chg="mod">
-          <ac:chgData name="Marcia Moraes" userId="c9c67e8a-58e2-4733-9a1c-5d44fec4775b" providerId="ADAL" clId="{13EBC211-F23B-468A-BCCD-307C1181F47D}" dt="2022-08-04T23:26:32.358" v="242" actId="20577"/>
-          <ac:spMkLst>
-            <pc:docMk/>
-            <pc:sldMk cId="0" sldId="258"/>
-            <ac:spMk id="202" creationId="{00000000-0000-0000-0000-000000000000}"/>
-          </ac:spMkLst>
-        </pc:spChg>
-        <pc:spChg chg="del">
-          <ac:chgData name="Marcia Moraes" userId="c9c67e8a-58e2-4733-9a1c-5d44fec4775b" providerId="ADAL" clId="{13EBC211-F23B-468A-BCCD-307C1181F47D}" dt="2022-08-04T23:32:25.008" v="276" actId="478"/>
-          <ac:spMkLst>
-            <pc:docMk/>
-            <pc:sldMk cId="0" sldId="258"/>
-            <ac:spMk id="203" creationId="{00000000-0000-0000-0000-000000000000}"/>
-          </ac:spMkLst>
-        </pc:spChg>
-        <pc:picChg chg="add mod">
-          <ac:chgData name="Marcia Moraes" userId="c9c67e8a-58e2-4733-9a1c-5d44fec4775b" providerId="ADAL" clId="{13EBC211-F23B-468A-BCCD-307C1181F47D}" dt="2022-08-04T23:38:14.230" v="304" actId="1076"/>
-          <ac:picMkLst>
-            <pc:docMk/>
-            <pc:sldMk cId="0" sldId="258"/>
-            <ac:picMk id="3074" creationId="{731435A3-FFBB-40E3-BA8A-2310D46DDE30}"/>
-          </ac:picMkLst>
-        </pc:picChg>
-        <pc:picChg chg="del">
-          <ac:chgData name="Marcia Moraes" userId="c9c67e8a-58e2-4733-9a1c-5d44fec4775b" providerId="ADAL" clId="{13EBC211-F23B-468A-BCCD-307C1181F47D}" dt="2022-08-04T23:26:36.125" v="243" actId="478"/>
-          <ac:picMkLst>
-            <pc:docMk/>
-            <pc:sldMk cId="0" sldId="258"/>
-            <ac:picMk id="4100" creationId="{8FF41CC3-3BB1-4DEB-B050-00F39D7BC219}"/>
-          </ac:picMkLst>
-        </pc:picChg>
-      </pc:sldChg>
-      <pc:sldChg chg="addSp delSp modSp delAnim modAnim">
-        <pc:chgData name="Marcia Moraes" userId="c9c67e8a-58e2-4733-9a1c-5d44fec4775b" providerId="ADAL" clId="{13EBC211-F23B-468A-BCCD-307C1181F47D}" dt="2022-08-05T01:01:06.306" v="1605" actId="20577"/>
-        <pc:sldMkLst>
-          <pc:docMk/>
-          <pc:sldMk cId="0" sldId="259"/>
-        </pc:sldMkLst>
-        <pc:spChg chg="add del mod">
-          <ac:chgData name="Marcia Moraes" userId="c9c67e8a-58e2-4733-9a1c-5d44fec4775b" providerId="ADAL" clId="{13EBC211-F23B-468A-BCCD-307C1181F47D}" dt="2022-08-05T00:58:41.564" v="1555" actId="478"/>
-          <ac:spMkLst>
-            <pc:docMk/>
-            <pc:sldMk cId="0" sldId="259"/>
-            <ac:spMk id="3" creationId="{72F2DB2F-2056-42EA-BDA8-F50B02A12EBD}"/>
-          </ac:spMkLst>
-        </pc:spChg>
-        <pc:spChg chg="mod">
-          <ac:chgData name="Marcia Moraes" userId="c9c67e8a-58e2-4733-9a1c-5d44fec4775b" providerId="ADAL" clId="{13EBC211-F23B-468A-BCCD-307C1181F47D}" dt="2022-08-05T00:41:21.183" v="1409" actId="6549"/>
-          <ac:spMkLst>
-            <pc:docMk/>
-            <pc:sldMk cId="0" sldId="259"/>
-            <ac:spMk id="209" creationId="{00000000-0000-0000-0000-000000000000}"/>
-          </ac:spMkLst>
-        </pc:spChg>
-        <pc:spChg chg="mod">
-          <ac:chgData name="Marcia Moraes" userId="c9c67e8a-58e2-4733-9a1c-5d44fec4775b" providerId="ADAL" clId="{13EBC211-F23B-468A-BCCD-307C1181F47D}" dt="2022-08-05T01:01:06.306" v="1605" actId="20577"/>
-          <ac:spMkLst>
-            <pc:docMk/>
-            <pc:sldMk cId="0" sldId="259"/>
-            <ac:spMk id="210" creationId="{00000000-0000-0000-0000-000000000000}"/>
-          </ac:spMkLst>
-        </pc:spChg>
-        <pc:picChg chg="add del mod">
-          <ac:chgData name="Marcia Moraes" userId="c9c67e8a-58e2-4733-9a1c-5d44fec4775b" providerId="ADAL" clId="{13EBC211-F23B-468A-BCCD-307C1181F47D}" dt="2022-08-05T00:58:42.540" v="1556" actId="478"/>
-          <ac:picMkLst>
-            <pc:docMk/>
-            <pc:sldMk cId="0" sldId="259"/>
-            <ac:picMk id="2" creationId="{2575394E-99C0-4E3E-8E9E-52855CBAFC04}"/>
-          </ac:picMkLst>
-        </pc:picChg>
-        <pc:picChg chg="add mod">
-          <ac:chgData name="Marcia Moraes" userId="c9c67e8a-58e2-4733-9a1c-5d44fec4775b" providerId="ADAL" clId="{13EBC211-F23B-468A-BCCD-307C1181F47D}" dt="2022-08-05T01:00:09.483" v="1601" actId="1076"/>
-          <ac:picMkLst>
-            <pc:docMk/>
-            <pc:sldMk cId="0" sldId="259"/>
-            <ac:picMk id="4" creationId="{36509FD2-5747-4F75-A74F-2F79A8C49059}"/>
-          </ac:picMkLst>
-        </pc:picChg>
-      </pc:sldChg>
-      <pc:sldChg chg="modSp">
-        <pc:chgData name="Marcia Moraes" userId="c9c67e8a-58e2-4733-9a1c-5d44fec4775b" providerId="ADAL" clId="{13EBC211-F23B-468A-BCCD-307C1181F47D}" dt="2022-08-05T02:37:39.867" v="2589" actId="20577"/>
-        <pc:sldMkLst>
-          <pc:docMk/>
-          <pc:sldMk cId="0" sldId="261"/>
-        </pc:sldMkLst>
-        <pc:spChg chg="mod">
-          <ac:chgData name="Marcia Moraes" userId="c9c67e8a-58e2-4733-9a1c-5d44fec4775b" providerId="ADAL" clId="{13EBC211-F23B-468A-BCCD-307C1181F47D}" dt="2022-08-05T02:37:39.867" v="2589" actId="20577"/>
-          <ac:spMkLst>
-            <pc:docMk/>
-            <pc:sldMk cId="0" sldId="261"/>
-            <ac:spMk id="3" creationId="{401F1007-2C43-4BFF-8517-F9FEEBF1B349}"/>
-          </ac:spMkLst>
-        </pc:spChg>
-        <pc:spChg chg="mod">
-          <ac:chgData name="Marcia Moraes" userId="c9c67e8a-58e2-4733-9a1c-5d44fec4775b" providerId="ADAL" clId="{13EBC211-F23B-468A-BCCD-307C1181F47D}" dt="2022-08-05T02:30:47.716" v="1948" actId="255"/>
-          <ac:spMkLst>
-            <pc:docMk/>
-            <pc:sldMk cId="0" sldId="261"/>
-            <ac:spMk id="223" creationId="{00000000-0000-0000-0000-000000000000}"/>
-          </ac:spMkLst>
-        </pc:spChg>
-      </pc:sldChg>
-      <pc:sldChg chg="addSp delSp modSp delAnim">
-        <pc:chgData name="Marcia Moraes" userId="c9c67e8a-58e2-4733-9a1c-5d44fec4775b" providerId="ADAL" clId="{13EBC211-F23B-468A-BCCD-307C1181F47D}" dt="2022-08-05T00:41:26.301" v="1412" actId="6549"/>
-        <pc:sldMkLst>
-          <pc:docMk/>
-          <pc:sldMk cId="612089606" sldId="265"/>
-        </pc:sldMkLst>
-        <pc:spChg chg="mod">
-          <ac:chgData name="Marcia Moraes" userId="c9c67e8a-58e2-4733-9a1c-5d44fec4775b" providerId="ADAL" clId="{13EBC211-F23B-468A-BCCD-307C1181F47D}" dt="2022-08-05T00:41:26.301" v="1412" actId="6549"/>
-          <ac:spMkLst>
-            <pc:docMk/>
-            <pc:sldMk cId="612089606" sldId="265"/>
-            <ac:spMk id="2" creationId="{7D3729BF-0D0D-AC4F-9874-B17B55D9775A}"/>
-          </ac:spMkLst>
-        </pc:spChg>
-        <pc:spChg chg="del">
-          <ac:chgData name="Marcia Moraes" userId="c9c67e8a-58e2-4733-9a1c-5d44fec4775b" providerId="ADAL" clId="{13EBC211-F23B-468A-BCCD-307C1181F47D}" dt="2022-08-05T00:19:32.874" v="864" actId="478"/>
-          <ac:spMkLst>
-            <pc:docMk/>
-            <pc:sldMk cId="612089606" sldId="265"/>
-            <ac:spMk id="5" creationId="{42A4F53F-D675-644F-829F-9A8E5587B624}"/>
-          </ac:spMkLst>
-        </pc:spChg>
-        <pc:spChg chg="del">
-          <ac:chgData name="Marcia Moraes" userId="c9c67e8a-58e2-4733-9a1c-5d44fec4775b" providerId="ADAL" clId="{13EBC211-F23B-468A-BCCD-307C1181F47D}" dt="2022-08-05T00:19:34.322" v="865" actId="478"/>
-          <ac:spMkLst>
-            <pc:docMk/>
-            <pc:sldMk cId="612089606" sldId="265"/>
-            <ac:spMk id="6" creationId="{CBA02610-3627-7649-94B6-504E7DDAAE13}"/>
-          </ac:spMkLst>
-        </pc:spChg>
-        <pc:spChg chg="add mod">
-          <ac:chgData name="Marcia Moraes" userId="c9c67e8a-58e2-4733-9a1c-5d44fec4775b" providerId="ADAL" clId="{13EBC211-F23B-468A-BCCD-307C1181F47D}" dt="2022-08-05T00:31:42.536" v="1253" actId="20577"/>
-          <ac:spMkLst>
-            <pc:docMk/>
-            <pc:sldMk cId="612089606" sldId="265"/>
-            <ac:spMk id="8" creationId="{0D85A0B8-2AB4-4782-83DB-6982D4BCB754}"/>
-          </ac:spMkLst>
-        </pc:spChg>
-        <pc:spChg chg="del">
-          <ac:chgData name="Marcia Moraes" userId="c9c67e8a-58e2-4733-9a1c-5d44fec4775b" providerId="ADAL" clId="{13EBC211-F23B-468A-BCCD-307C1181F47D}" dt="2022-08-05T00:19:30.555" v="863" actId="478"/>
-          <ac:spMkLst>
-            <pc:docMk/>
-            <pc:sldMk cId="612089606" sldId="265"/>
-            <ac:spMk id="10" creationId="{CDE7C1FD-C867-9341-83F3-5A5EA209921F}"/>
-          </ac:spMkLst>
-        </pc:spChg>
-        <pc:graphicFrameChg chg="del">
-          <ac:chgData name="Marcia Moraes" userId="c9c67e8a-58e2-4733-9a1c-5d44fec4775b" providerId="ADAL" clId="{13EBC211-F23B-468A-BCCD-307C1181F47D}" dt="2022-08-05T00:19:34.322" v="865" actId="478"/>
-          <ac:graphicFrameMkLst>
-            <pc:docMk/>
-            <pc:sldMk cId="612089606" sldId="265"/>
-            <ac:graphicFrameMk id="4" creationId="{0C0874D0-16A8-6C45-BD60-6CC694F1BA2E}"/>
-          </ac:graphicFrameMkLst>
-        </pc:graphicFrameChg>
-        <pc:picChg chg="del">
-          <ac:chgData name="Marcia Moraes" userId="c9c67e8a-58e2-4733-9a1c-5d44fec4775b" providerId="ADAL" clId="{13EBC211-F23B-468A-BCCD-307C1181F47D}" dt="2022-08-05T00:16:05.284" v="862" actId="478"/>
-          <ac:picMkLst>
-            <pc:docMk/>
-            <pc:sldMk cId="612089606" sldId="265"/>
-            <ac:picMk id="5122" creationId="{A0B8BBAA-B7D5-4B19-B4ED-D8CB07E577F1}"/>
-          </ac:picMkLst>
-        </pc:picChg>
-      </pc:sldChg>
-      <pc:sldChg chg="addSp delSp modSp">
-        <pc:chgData name="Marcia Moraes" userId="c9c67e8a-58e2-4733-9a1c-5d44fec4775b" providerId="ADAL" clId="{13EBC211-F23B-468A-BCCD-307C1181F47D}" dt="2022-08-04T23:48:34.399" v="504" actId="1076"/>
-        <pc:sldMkLst>
-          <pc:docMk/>
-          <pc:sldMk cId="2954226462" sldId="268"/>
-        </pc:sldMkLst>
-        <pc:spChg chg="del mod">
-          <ac:chgData name="Marcia Moraes" userId="c9c67e8a-58e2-4733-9a1c-5d44fec4775b" providerId="ADAL" clId="{13EBC211-F23B-468A-BCCD-307C1181F47D}" dt="2022-08-04T23:48:31.588" v="503" actId="478"/>
-          <ac:spMkLst>
-            <pc:docMk/>
-            <pc:sldMk cId="2954226462" sldId="268"/>
-            <ac:spMk id="6" creationId="{3D9F4D3B-2C08-BE45-8FD4-7843D5BB5458}"/>
-          </ac:spMkLst>
-        </pc:spChg>
-        <pc:spChg chg="mod">
-          <ac:chgData name="Marcia Moraes" userId="c9c67e8a-58e2-4733-9a1c-5d44fec4775b" providerId="ADAL" clId="{13EBC211-F23B-468A-BCCD-307C1181F47D}" dt="2022-08-04T23:48:34.399" v="504" actId="1076"/>
-          <ac:spMkLst>
-            <pc:docMk/>
-            <pc:sldMk cId="2954226462" sldId="268"/>
-            <ac:spMk id="7" creationId="{F1F79DD2-1F3F-234C-A44A-3A87D436D29A}"/>
-          </ac:spMkLst>
-        </pc:spChg>
-        <pc:picChg chg="add mod">
-          <ac:chgData name="Marcia Moraes" userId="c9c67e8a-58e2-4733-9a1c-5d44fec4775b" providerId="ADAL" clId="{13EBC211-F23B-468A-BCCD-307C1181F47D}" dt="2022-08-04T23:08:45.316" v="16" actId="1076"/>
-          <ac:picMkLst>
-            <pc:docMk/>
-            <pc:sldMk cId="2954226462" sldId="268"/>
-            <ac:picMk id="8" creationId="{747C9EB5-B54F-455C-8EBF-7A7FE4670F56}"/>
-          </ac:picMkLst>
-        </pc:picChg>
-        <pc:picChg chg="del">
-          <ac:chgData name="Marcia Moraes" userId="c9c67e8a-58e2-4733-9a1c-5d44fec4775b" providerId="ADAL" clId="{13EBC211-F23B-468A-BCCD-307C1181F47D}" dt="2022-08-04T23:08:10.192" v="12" actId="478"/>
-          <ac:picMkLst>
-            <pc:docMk/>
-            <pc:sldMk cId="2954226462" sldId="268"/>
-            <ac:picMk id="10" creationId="{56832A76-856E-4926-A217-96F65757A802}"/>
-          </ac:picMkLst>
-        </pc:picChg>
-        <pc:picChg chg="add del">
-          <ac:chgData name="Marcia Moraes" userId="c9c67e8a-58e2-4733-9a1c-5d44fec4775b" providerId="ADAL" clId="{13EBC211-F23B-468A-BCCD-307C1181F47D}" dt="2022-08-04T23:08:14.422" v="14"/>
-          <ac:picMkLst>
-            <pc:docMk/>
-            <pc:sldMk cId="2954226462" sldId="268"/>
-            <ac:picMk id="2050" creationId="{747C9EB5-B54F-455C-8EBF-7A7FE4670F56}"/>
-          </ac:picMkLst>
-        </pc:picChg>
-      </pc:sldChg>
-      <pc:sldChg chg="addSp delSp modSp">
-        <pc:chgData name="Marcia Moraes" userId="c9c67e8a-58e2-4733-9a1c-5d44fec4775b" providerId="ADAL" clId="{13EBC211-F23B-468A-BCCD-307C1181F47D}" dt="2022-08-05T00:56:01.730" v="1483" actId="1076"/>
+        <pc:chgData name="Marcia Moraes" userId="c9c67e8a-58e2-4733-9a1c-5d44fec4775b" providerId="ADAL" clId="{892381FB-0338-431E-AA1B-EA41B390EDFC}" dt="2024-06-03T21:34:55.686" v="1" actId="6549"/>
         <pc:sldMkLst>
           <pc:docMk/>
           <pc:sldMk cId="273496234" sldId="269"/>
         </pc:sldMkLst>
         <pc:spChg chg="mod">
-          <ac:chgData name="Marcia Moraes" userId="c9c67e8a-58e2-4733-9a1c-5d44fec4775b" providerId="ADAL" clId="{13EBC211-F23B-468A-BCCD-307C1181F47D}" dt="2022-08-05T00:56:01.730" v="1483" actId="1076"/>
-          <ac:spMkLst>
-            <pc:docMk/>
-            <pc:sldMk cId="273496234" sldId="269"/>
-            <ac:spMk id="2" creationId="{A0C2E36F-43C4-184F-BD5B-4B8C1E48C15C}"/>
-          </ac:spMkLst>
-        </pc:spChg>
-        <pc:spChg chg="del">
-          <ac:chgData name="Marcia Moraes" userId="c9c67e8a-58e2-4733-9a1c-5d44fec4775b" providerId="ADAL" clId="{13EBC211-F23B-468A-BCCD-307C1181F47D}" dt="2022-08-05T00:55:09.985" v="1478" actId="478"/>
-          <ac:spMkLst>
-            <pc:docMk/>
-            <pc:sldMk cId="273496234" sldId="269"/>
-            <ac:spMk id="3" creationId="{1D529CCF-21DF-C842-B7F2-62E2EBAA1DBF}"/>
-          </ac:spMkLst>
-        </pc:spChg>
-        <pc:spChg chg="add mod">
-          <ac:chgData name="Marcia Moraes" userId="c9c67e8a-58e2-4733-9a1c-5d44fec4775b" providerId="ADAL" clId="{13EBC211-F23B-468A-BCCD-307C1181F47D}" dt="2022-08-05T00:55:35.802" v="1481" actId="255"/>
+          <ac:chgData name="Marcia Moraes" userId="c9c67e8a-58e2-4733-9a1c-5d44fec4775b" providerId="ADAL" clId="{892381FB-0338-431E-AA1B-EA41B390EDFC}" dt="2024-06-03T21:34:55.686" v="1" actId="6549"/>
           <ac:spMkLst>
             <pc:docMk/>
             <pc:sldMk cId="273496234" sldId="269"/>
             <ac:spMk id="6" creationId="{C6FA4863-C65D-4223-949E-52D40B2CA80D}"/>
           </ac:spMkLst>
         </pc:spChg>
-        <pc:picChg chg="del">
-          <ac:chgData name="Marcia Moraes" userId="c9c67e8a-58e2-4733-9a1c-5d44fec4775b" providerId="ADAL" clId="{13EBC211-F23B-468A-BCCD-307C1181F47D}" dt="2022-08-05T00:55:07.670" v="1477" actId="478"/>
-          <ac:picMkLst>
-            <pc:docMk/>
-            <pc:sldMk cId="273496234" sldId="269"/>
-            <ac:picMk id="5" creationId="{EB8811A8-C009-46B3-BDE4-17B1D4F0C23F}"/>
-          </ac:picMkLst>
-        </pc:picChg>
-        <pc:picChg chg="add">
-          <ac:chgData name="Marcia Moraes" userId="c9c67e8a-58e2-4733-9a1c-5d44fec4775b" providerId="ADAL" clId="{13EBC211-F23B-468A-BCCD-307C1181F47D}" dt="2022-08-05T00:55:40.819" v="1482"/>
-          <ac:picMkLst>
-            <pc:docMk/>
-            <pc:sldMk cId="273496234" sldId="269"/>
-            <ac:picMk id="7" creationId="{2C83B577-C20A-4A39-A98D-991CDD36241E}"/>
-          </ac:picMkLst>
-        </pc:picChg>
       </pc:sldChg>
-      <pc:sldChg chg="del">
-        <pc:chgData name="Marcia Moraes" userId="c9c67e8a-58e2-4733-9a1c-5d44fec4775b" providerId="ADAL" clId="{13EBC211-F23B-468A-BCCD-307C1181F47D}" dt="2022-08-05T02:29:42.718" v="1916" actId="2696"/>
-        <pc:sldMkLst>
-          <pc:docMk/>
-          <pc:sldMk cId="3803316299" sldId="270"/>
-        </pc:sldMkLst>
-      </pc:sldChg>
-      <pc:sldChg chg="del">
-        <pc:chgData name="Marcia Moraes" userId="c9c67e8a-58e2-4733-9a1c-5d44fec4775b" providerId="ADAL" clId="{13EBC211-F23B-468A-BCCD-307C1181F47D}" dt="2022-08-04T22:47:23.199" v="1" actId="2696"/>
-        <pc:sldMkLst>
-          <pc:docMk/>
-          <pc:sldMk cId="3355554402" sldId="271"/>
-        </pc:sldMkLst>
-      </pc:sldChg>
-      <pc:sldChg chg="del">
-        <pc:chgData name="Marcia Moraes" userId="c9c67e8a-58e2-4733-9a1c-5d44fec4775b" providerId="ADAL" clId="{13EBC211-F23B-468A-BCCD-307C1181F47D}" dt="2022-08-05T00:36:17.380" v="1254" actId="2696"/>
-        <pc:sldMkLst>
-          <pc:docMk/>
-          <pc:sldMk cId="2737657980" sldId="283"/>
-        </pc:sldMkLst>
-      </pc:sldChg>
-      <pc:sldChg chg="del">
-        <pc:chgData name="Marcia Moraes" userId="c9c67e8a-58e2-4733-9a1c-5d44fec4775b" providerId="ADAL" clId="{13EBC211-F23B-468A-BCCD-307C1181F47D}" dt="2022-08-04T22:47:21.920" v="0" actId="2696"/>
-        <pc:sldMkLst>
-          <pc:docMk/>
-          <pc:sldMk cId="494069893" sldId="284"/>
-        </pc:sldMkLst>
-      </pc:sldChg>
-      <pc:sldChg chg="del">
-        <pc:chgData name="Marcia Moraes" userId="c9c67e8a-58e2-4733-9a1c-5d44fec4775b" providerId="ADAL" clId="{13EBC211-F23B-468A-BCCD-307C1181F47D}" dt="2022-08-04T22:47:24.212" v="2" actId="2696"/>
-        <pc:sldMkLst>
-          <pc:docMk/>
-          <pc:sldMk cId="1803721962" sldId="285"/>
-        </pc:sldMkLst>
-      </pc:sldChg>
-      <pc:sldChg chg="addSp delSp modSp delAnim modAnim">
-        <pc:chgData name="Marcia Moraes" userId="c9c67e8a-58e2-4733-9a1c-5d44fec4775b" providerId="ADAL" clId="{13EBC211-F23B-468A-BCCD-307C1181F47D}" dt="2022-08-04T23:40:30.270" v="376" actId="1076"/>
-        <pc:sldMkLst>
-          <pc:docMk/>
-          <pc:sldMk cId="0" sldId="286"/>
-        </pc:sldMkLst>
-        <pc:spChg chg="del">
-          <ac:chgData name="Marcia Moraes" userId="c9c67e8a-58e2-4733-9a1c-5d44fec4775b" providerId="ADAL" clId="{13EBC211-F23B-468A-BCCD-307C1181F47D}" dt="2022-08-04T22:53:49.172" v="7" actId="478"/>
-          <ac:spMkLst>
-            <pc:docMk/>
-            <pc:sldMk cId="0" sldId="286"/>
-            <ac:spMk id="2" creationId="{FA02E0B5-0CD0-5044-967B-F154BAD0FC18}"/>
-          </ac:spMkLst>
-        </pc:spChg>
-        <pc:spChg chg="del">
-          <ac:chgData name="Marcia Moraes" userId="c9c67e8a-58e2-4733-9a1c-5d44fec4775b" providerId="ADAL" clId="{13EBC211-F23B-468A-BCCD-307C1181F47D}" dt="2022-08-04T22:53:37.267" v="5" actId="478"/>
-          <ac:spMkLst>
-            <pc:docMk/>
-            <pc:sldMk cId="0" sldId="286"/>
-            <ac:spMk id="3" creationId="{939FB413-D8D8-452E-9784-65A78678430F}"/>
-          </ac:spMkLst>
-        </pc:spChg>
-        <pc:spChg chg="del">
-          <ac:chgData name="Marcia Moraes" userId="c9c67e8a-58e2-4733-9a1c-5d44fec4775b" providerId="ADAL" clId="{13EBC211-F23B-468A-BCCD-307C1181F47D}" dt="2022-08-04T22:53:35.994" v="4" actId="478"/>
-          <ac:spMkLst>
-            <pc:docMk/>
-            <pc:sldMk cId="0" sldId="286"/>
-            <ac:spMk id="4" creationId="{CE808C4B-DF89-464D-879C-0B4E691452F8}"/>
-          </ac:spMkLst>
-        </pc:spChg>
-        <pc:spChg chg="add mod">
-          <ac:chgData name="Marcia Moraes" userId="c9c67e8a-58e2-4733-9a1c-5d44fec4775b" providerId="ADAL" clId="{13EBC211-F23B-468A-BCCD-307C1181F47D}" dt="2022-08-04T23:23:26.981" v="195" actId="1076"/>
-          <ac:spMkLst>
-            <pc:docMk/>
-            <pc:sldMk cId="0" sldId="286"/>
-            <ac:spMk id="6" creationId="{BBA84413-A189-4E45-8BC1-0BAF8D04460A}"/>
-          </ac:spMkLst>
-        </pc:spChg>
-        <pc:spChg chg="add mod">
-          <ac:chgData name="Marcia Moraes" userId="c9c67e8a-58e2-4733-9a1c-5d44fec4775b" providerId="ADAL" clId="{13EBC211-F23B-468A-BCCD-307C1181F47D}" dt="2022-08-04T23:40:30.270" v="376" actId="1076"/>
-          <ac:spMkLst>
-            <pc:docMk/>
-            <pc:sldMk cId="0" sldId="286"/>
-            <ac:spMk id="7" creationId="{97938BAB-19A9-47CC-ADA7-454430B9D725}"/>
-          </ac:spMkLst>
-        </pc:spChg>
-        <pc:spChg chg="add mod">
-          <ac:chgData name="Marcia Moraes" userId="c9c67e8a-58e2-4733-9a1c-5d44fec4775b" providerId="ADAL" clId="{13EBC211-F23B-468A-BCCD-307C1181F47D}" dt="2022-08-04T23:40:22.173" v="375" actId="1076"/>
-          <ac:spMkLst>
-            <pc:docMk/>
-            <pc:sldMk cId="0" sldId="286"/>
-            <ac:spMk id="8" creationId="{47181C82-494A-4319-90F2-D3F6CCEA3390}"/>
-          </ac:spMkLst>
-        </pc:spChg>
-        <pc:spChg chg="del">
-          <ac:chgData name="Marcia Moraes" userId="c9c67e8a-58e2-4733-9a1c-5d44fec4775b" providerId="ADAL" clId="{13EBC211-F23B-468A-BCCD-307C1181F47D}" dt="2022-08-04T22:53:47.262" v="6" actId="478"/>
-          <ac:spMkLst>
-            <pc:docMk/>
-            <pc:sldMk cId="0" sldId="286"/>
-            <ac:spMk id="10" creationId="{B9C19C6A-D067-42BE-8501-0795E4C28EBC}"/>
-          </ac:spMkLst>
-        </pc:spChg>
-        <pc:spChg chg="mod">
-          <ac:chgData name="Marcia Moraes" userId="c9c67e8a-58e2-4733-9a1c-5d44fec4775b" providerId="ADAL" clId="{13EBC211-F23B-468A-BCCD-307C1181F47D}" dt="2022-08-04T23:15:09.215" v="100" actId="5793"/>
-          <ac:spMkLst>
-            <pc:docMk/>
-            <pc:sldMk cId="0" sldId="286"/>
-            <ac:spMk id="192" creationId="{00000000-0000-0000-0000-000000000000}"/>
-          </ac:spMkLst>
-        </pc:spChg>
-        <pc:spChg chg="del">
-          <ac:chgData name="Marcia Moraes" userId="c9c67e8a-58e2-4733-9a1c-5d44fec4775b" providerId="ADAL" clId="{13EBC211-F23B-468A-BCCD-307C1181F47D}" dt="2022-08-04T23:13:56.529" v="61" actId="478"/>
-          <ac:spMkLst>
-            <pc:docMk/>
-            <pc:sldMk cId="0" sldId="286"/>
-            <ac:spMk id="194" creationId="{00000000-0000-0000-0000-000000000000}"/>
-          </ac:spMkLst>
-        </pc:spChg>
-        <pc:picChg chg="add del mod">
-          <ac:chgData name="Marcia Moraes" userId="c9c67e8a-58e2-4733-9a1c-5d44fec4775b" providerId="ADAL" clId="{13EBC211-F23B-468A-BCCD-307C1181F47D}" dt="2022-08-04T23:06:33.923" v="11" actId="478"/>
-          <ac:picMkLst>
-            <pc:docMk/>
-            <pc:sldMk cId="0" sldId="286"/>
-            <ac:picMk id="1026" creationId="{7D580A0C-04D7-482F-B734-B326F844389B}"/>
-          </ac:picMkLst>
-        </pc:picChg>
-        <pc:picChg chg="add mod">
-          <ac:chgData name="Marcia Moraes" userId="c9c67e8a-58e2-4733-9a1c-5d44fec4775b" providerId="ADAL" clId="{13EBC211-F23B-468A-BCCD-307C1181F47D}" dt="2022-08-04T23:17:17.373" v="147" actId="1076"/>
-          <ac:picMkLst>
-            <pc:docMk/>
-            <pc:sldMk cId="0" sldId="286"/>
-            <ac:picMk id="1028" creationId="{159CE090-BDB1-45FD-B5EB-7A57FE74DF17}"/>
-          </ac:picMkLst>
-        </pc:picChg>
-        <pc:picChg chg="add del mod">
-          <ac:chgData name="Marcia Moraes" userId="c9c67e8a-58e2-4733-9a1c-5d44fec4775b" providerId="ADAL" clId="{13EBC211-F23B-468A-BCCD-307C1181F47D}" dt="2022-08-04T23:24:08.586" v="198" actId="478"/>
-          <ac:picMkLst>
-            <pc:docMk/>
-            <pc:sldMk cId="0" sldId="286"/>
-            <ac:picMk id="1030" creationId="{B28F3AFD-4471-4315-9498-AB272D8DAD23}"/>
-          </ac:picMkLst>
-        </pc:picChg>
-        <pc:picChg chg="add mod">
-          <ac:chgData name="Marcia Moraes" userId="c9c67e8a-58e2-4733-9a1c-5d44fec4775b" providerId="ADAL" clId="{13EBC211-F23B-468A-BCCD-307C1181F47D}" dt="2022-08-04T23:24:21.014" v="203" actId="1076"/>
-          <ac:picMkLst>
-            <pc:docMk/>
-            <pc:sldMk cId="0" sldId="286"/>
-            <ac:picMk id="1032" creationId="{F893F4FD-B424-4BDC-A5A5-B5C11A841B87}"/>
-          </ac:picMkLst>
-        </pc:picChg>
-      </pc:sldChg>
-      <pc:sldChg chg="addSp delSp modSp modAnim">
-        <pc:chgData name="Marcia Moraes" userId="c9c67e8a-58e2-4733-9a1c-5d44fec4775b" providerId="ADAL" clId="{13EBC211-F23B-468A-BCCD-307C1181F47D}" dt="2022-08-05T02:29:15.896" v="1894" actId="255"/>
-        <pc:sldMkLst>
-          <pc:docMk/>
-          <pc:sldMk cId="2945212090" sldId="287"/>
-        </pc:sldMkLst>
-        <pc:spChg chg="mod">
-          <ac:chgData name="Marcia Moraes" userId="c9c67e8a-58e2-4733-9a1c-5d44fec4775b" providerId="ADAL" clId="{13EBC211-F23B-468A-BCCD-307C1181F47D}" dt="2022-08-05T02:29:15.896" v="1894" actId="255"/>
-          <ac:spMkLst>
-            <pc:docMk/>
-            <pc:sldMk cId="2945212090" sldId="287"/>
-            <ac:spMk id="2" creationId="{6302E6FC-80C8-2F4C-A9F0-9B205434775A}"/>
-          </ac:spMkLst>
-        </pc:spChg>
-        <pc:spChg chg="mod">
-          <ac:chgData name="Marcia Moraes" userId="c9c67e8a-58e2-4733-9a1c-5d44fec4775b" providerId="ADAL" clId="{13EBC211-F23B-468A-BCCD-307C1181F47D}" dt="2022-08-05T01:32:42.269" v="1816" actId="20577"/>
-          <ac:spMkLst>
-            <pc:docMk/>
-            <pc:sldMk cId="2945212090" sldId="287"/>
-            <ac:spMk id="3" creationId="{93E01694-2C32-BA4D-B6F8-4BE99716E841}"/>
-          </ac:spMkLst>
-        </pc:spChg>
-        <pc:spChg chg="add del">
-          <ac:chgData name="Marcia Moraes" userId="c9c67e8a-58e2-4733-9a1c-5d44fec4775b" providerId="ADAL" clId="{13EBC211-F23B-468A-BCCD-307C1181F47D}" dt="2022-08-05T01:29:19.011" v="1686" actId="478"/>
-          <ac:spMkLst>
-            <pc:docMk/>
-            <pc:sldMk cId="2945212090" sldId="287"/>
-            <ac:spMk id="5" creationId="{A1C819D2-80CA-4D25-88C7-0CD0B0DC0B68}"/>
-          </ac:spMkLst>
-        </pc:spChg>
-        <pc:spChg chg="add mod">
-          <ac:chgData name="Marcia Moraes" userId="c9c67e8a-58e2-4733-9a1c-5d44fec4775b" providerId="ADAL" clId="{13EBC211-F23B-468A-BCCD-307C1181F47D}" dt="2022-08-05T01:32:16.666" v="1812" actId="1076"/>
-          <ac:spMkLst>
-            <pc:docMk/>
-            <pc:sldMk cId="2945212090" sldId="287"/>
-            <ac:spMk id="8" creationId="{1238E34D-3F42-431B-8299-5D95D119F363}"/>
-          </ac:spMkLst>
-        </pc:spChg>
-        <pc:spChg chg="add mod">
-          <ac:chgData name="Marcia Moraes" userId="c9c67e8a-58e2-4733-9a1c-5d44fec4775b" providerId="ADAL" clId="{13EBC211-F23B-468A-BCCD-307C1181F47D}" dt="2022-08-05T01:34:12.949" v="1822" actId="1076"/>
-          <ac:spMkLst>
-            <pc:docMk/>
-            <pc:sldMk cId="2945212090" sldId="287"/>
-            <ac:spMk id="11" creationId="{DDABD8E9-00AF-4545-AA15-17E9BFB5604C}"/>
-          </ac:spMkLst>
-        </pc:spChg>
-        <pc:spChg chg="add mod">
-          <ac:chgData name="Marcia Moraes" userId="c9c67e8a-58e2-4733-9a1c-5d44fec4775b" providerId="ADAL" clId="{13EBC211-F23B-468A-BCCD-307C1181F47D}" dt="2022-08-05T01:37:16.852" v="1832" actId="1076"/>
-          <ac:spMkLst>
-            <pc:docMk/>
-            <pc:sldMk cId="2945212090" sldId="287"/>
-            <ac:spMk id="14" creationId="{4E3BA20C-5A3F-48AA-8B6D-29065BC1A3F6}"/>
-          </ac:spMkLst>
-        </pc:spChg>
-        <pc:picChg chg="del">
-          <ac:chgData name="Marcia Moraes" userId="c9c67e8a-58e2-4733-9a1c-5d44fec4775b" providerId="ADAL" clId="{13EBC211-F23B-468A-BCCD-307C1181F47D}" dt="2022-08-05T01:12:28.915" v="1667" actId="478"/>
-          <ac:picMkLst>
-            <pc:docMk/>
-            <pc:sldMk cId="2945212090" sldId="287"/>
-            <ac:picMk id="4" creationId="{8CAAB949-8980-42BD-8F41-71C0B8CED334}"/>
-          </ac:picMkLst>
-        </pc:picChg>
-        <pc:picChg chg="add mod">
-          <ac:chgData name="Marcia Moraes" userId="c9c67e8a-58e2-4733-9a1c-5d44fec4775b" providerId="ADAL" clId="{13EBC211-F23B-468A-BCCD-307C1181F47D}" dt="2022-08-05T01:31:23.450" v="1807" actId="1076"/>
-          <ac:picMkLst>
-            <pc:docMk/>
-            <pc:sldMk cId="2945212090" sldId="287"/>
-            <ac:picMk id="6" creationId="{46743590-FE97-4D0B-BC5B-A0C5AF0BB8CC}"/>
-          </ac:picMkLst>
-        </pc:picChg>
-        <pc:picChg chg="add mod">
-          <ac:chgData name="Marcia Moraes" userId="c9c67e8a-58e2-4733-9a1c-5d44fec4775b" providerId="ADAL" clId="{13EBC211-F23B-468A-BCCD-307C1181F47D}" dt="2022-08-05T01:37:09.459" v="1830" actId="1076"/>
-          <ac:picMkLst>
-            <pc:docMk/>
-            <pc:sldMk cId="2945212090" sldId="287"/>
-            <ac:picMk id="7" creationId="{EB107B2F-C5E1-4A56-ABAC-F84DA3A8E1F2}"/>
-          </ac:picMkLst>
-        </pc:picChg>
-        <pc:picChg chg="add mod">
-          <ac:chgData name="Marcia Moraes" userId="c9c67e8a-58e2-4733-9a1c-5d44fec4775b" providerId="ADAL" clId="{13EBC211-F23B-468A-BCCD-307C1181F47D}" dt="2022-08-05T01:33:35.943" v="1818" actId="1076"/>
-          <ac:picMkLst>
-            <pc:docMk/>
-            <pc:sldMk cId="2945212090" sldId="287"/>
-            <ac:picMk id="9" creationId="{EAA64842-8276-4F3A-9268-C6A8DD0F6505}"/>
-          </ac:picMkLst>
-        </pc:picChg>
-        <pc:picChg chg="add mod">
-          <ac:chgData name="Marcia Moraes" userId="c9c67e8a-58e2-4733-9a1c-5d44fec4775b" providerId="ADAL" clId="{13EBC211-F23B-468A-BCCD-307C1181F47D}" dt="2022-08-05T01:37:06.937" v="1829" actId="1076"/>
-          <ac:picMkLst>
-            <pc:docMk/>
-            <pc:sldMk cId="2945212090" sldId="287"/>
-            <ac:picMk id="10" creationId="{B7DDFD8A-696E-4EC7-B843-1FC38A17CBB0}"/>
-          </ac:picMkLst>
-        </pc:picChg>
-        <pc:picChg chg="add mod">
-          <ac:chgData name="Marcia Moraes" userId="c9c67e8a-58e2-4733-9a1c-5d44fec4775b" providerId="ADAL" clId="{13EBC211-F23B-468A-BCCD-307C1181F47D}" dt="2022-08-05T01:35:57.832" v="1826" actId="1076"/>
-          <ac:picMkLst>
-            <pc:docMk/>
-            <pc:sldMk cId="2945212090" sldId="287"/>
-            <ac:picMk id="12" creationId="{91377548-5B56-43CC-83B0-9769454EA229}"/>
-          </ac:picMkLst>
-        </pc:picChg>
-        <pc:picChg chg="add mod">
-          <ac:chgData name="Marcia Moraes" userId="c9c67e8a-58e2-4733-9a1c-5d44fec4775b" providerId="ADAL" clId="{13EBC211-F23B-468A-BCCD-307C1181F47D}" dt="2022-08-05T01:37:05.111" v="1828" actId="1076"/>
-          <ac:picMkLst>
-            <pc:docMk/>
-            <pc:sldMk cId="2945212090" sldId="287"/>
-            <ac:picMk id="13" creationId="{1C23C1DF-3F5D-4468-9FD3-05B1B93C7ED6}"/>
-          </ac:picMkLst>
-        </pc:picChg>
-      </pc:sldChg>
-      <pc:sldChg chg="add del">
-        <pc:chgData name="Marcia Moraes" userId="c9c67e8a-58e2-4733-9a1c-5d44fec4775b" providerId="ADAL" clId="{13EBC211-F23B-468A-BCCD-307C1181F47D}" dt="2022-08-05T00:14:34.380" v="842" actId="2696"/>
-        <pc:sldMkLst>
-          <pc:docMk/>
-          <pc:sldMk cId="1080862108" sldId="288"/>
-        </pc:sldMkLst>
-      </pc:sldChg>
-      <pc:sldChg chg="addSp delSp modSp add modAnim">
-        <pc:chgData name="Marcia Moraes" userId="c9c67e8a-58e2-4733-9a1c-5d44fec4775b" providerId="ADAL" clId="{13EBC211-F23B-468A-BCCD-307C1181F47D}" dt="2022-08-05T01:05:53.770" v="1657" actId="20577"/>
-        <pc:sldMkLst>
-          <pc:docMk/>
-          <pc:sldMk cId="1153038980" sldId="288"/>
-        </pc:sldMkLst>
-        <pc:spChg chg="mod">
-          <ac:chgData name="Marcia Moraes" userId="c9c67e8a-58e2-4733-9a1c-5d44fec4775b" providerId="ADAL" clId="{13EBC211-F23B-468A-BCCD-307C1181F47D}" dt="2022-08-05T01:05:53.770" v="1657" actId="20577"/>
-          <ac:spMkLst>
-            <pc:docMk/>
-            <pc:sldMk cId="1153038980" sldId="288"/>
-            <ac:spMk id="2" creationId="{7D3729BF-0D0D-AC4F-9874-B17B55D9775A}"/>
-          </ac:spMkLst>
-        </pc:spChg>
-        <pc:spChg chg="add mod">
-          <ac:chgData name="Marcia Moraes" userId="c9c67e8a-58e2-4733-9a1c-5d44fec4775b" providerId="ADAL" clId="{13EBC211-F23B-468A-BCCD-307C1181F47D}" dt="2022-08-05T00:53:43.967" v="1457" actId="20577"/>
-          <ac:spMkLst>
-            <pc:docMk/>
-            <pc:sldMk cId="1153038980" sldId="288"/>
-            <ac:spMk id="6" creationId="{EDD94CEF-B264-46C4-892F-0565B001035C}"/>
-          </ac:spMkLst>
-        </pc:spChg>
-        <pc:spChg chg="del">
-          <ac:chgData name="Marcia Moraes" userId="c9c67e8a-58e2-4733-9a1c-5d44fec4775b" providerId="ADAL" clId="{13EBC211-F23B-468A-BCCD-307C1181F47D}" dt="2022-08-05T00:36:28.098" v="1268" actId="478"/>
-          <ac:spMkLst>
-            <pc:docMk/>
-            <pc:sldMk cId="1153038980" sldId="288"/>
-            <ac:spMk id="8" creationId="{0D85A0B8-2AB4-4782-83DB-6982D4BCB754}"/>
-          </ac:spMkLst>
-        </pc:spChg>
-        <pc:picChg chg="add del">
-          <ac:chgData name="Marcia Moraes" userId="c9c67e8a-58e2-4733-9a1c-5d44fec4775b" providerId="ADAL" clId="{13EBC211-F23B-468A-BCCD-307C1181F47D}" dt="2022-08-05T00:37:22.956" v="1270" actId="478"/>
-          <ac:picMkLst>
-            <pc:docMk/>
-            <pc:sldMk cId="1153038980" sldId="288"/>
-            <ac:picMk id="3" creationId="{D9FDF6E7-09A4-45C6-9DA4-15B174152F8C}"/>
-          </ac:picMkLst>
-        </pc:picChg>
-        <pc:picChg chg="add mod">
-          <ac:chgData name="Marcia Moraes" userId="c9c67e8a-58e2-4733-9a1c-5d44fec4775b" providerId="ADAL" clId="{13EBC211-F23B-468A-BCCD-307C1181F47D}" dt="2022-08-05T00:38:41.859" v="1273" actId="1076"/>
-          <ac:picMkLst>
-            <pc:docMk/>
-            <pc:sldMk cId="1153038980" sldId="288"/>
-            <ac:picMk id="4" creationId="{CCED1E14-C3F2-449C-97E3-FA15C761422B}"/>
-          </ac:picMkLst>
-        </pc:picChg>
-      </pc:sldChg>
-      <pc:sldChg chg="addSp delSp modSp add modAnim">
-        <pc:chgData name="Marcia Moraes" userId="c9c67e8a-58e2-4733-9a1c-5d44fec4775b" providerId="ADAL" clId="{13EBC211-F23B-468A-BCCD-307C1181F47D}" dt="2022-08-05T01:06:09.539" v="1666" actId="255"/>
-        <pc:sldMkLst>
-          <pc:docMk/>
-          <pc:sldMk cId="2458664928" sldId="289"/>
-        </pc:sldMkLst>
-        <pc:spChg chg="mod">
-          <ac:chgData name="Marcia Moraes" userId="c9c67e8a-58e2-4733-9a1c-5d44fec4775b" providerId="ADAL" clId="{13EBC211-F23B-468A-BCCD-307C1181F47D}" dt="2022-08-05T01:06:09.539" v="1666" actId="255"/>
-          <ac:spMkLst>
-            <pc:docMk/>
-            <pc:sldMk cId="2458664928" sldId="289"/>
-            <ac:spMk id="2" creationId="{7D3729BF-0D0D-AC4F-9874-B17B55D9775A}"/>
-          </ac:spMkLst>
-        </pc:spChg>
-        <pc:spChg chg="mod">
-          <ac:chgData name="Marcia Moraes" userId="c9c67e8a-58e2-4733-9a1c-5d44fec4775b" providerId="ADAL" clId="{13EBC211-F23B-468A-BCCD-307C1181F47D}" dt="2022-08-05T00:53:35.461" v="1445" actId="20577"/>
-          <ac:spMkLst>
-            <pc:docMk/>
-            <pc:sldMk cId="2458664928" sldId="289"/>
-            <ac:spMk id="6" creationId="{EDD94CEF-B264-46C4-892F-0565B001035C}"/>
-          </ac:spMkLst>
-        </pc:spChg>
-        <pc:picChg chg="add mod">
-          <ac:chgData name="Marcia Moraes" userId="c9c67e8a-58e2-4733-9a1c-5d44fec4775b" providerId="ADAL" clId="{13EBC211-F23B-468A-BCCD-307C1181F47D}" dt="2022-08-05T00:52:57.202" v="1425" actId="1076"/>
-          <ac:picMkLst>
-            <pc:docMk/>
-            <pc:sldMk cId="2458664928" sldId="289"/>
-            <ac:picMk id="3" creationId="{93C8B55C-67DC-49BD-8E3C-EE4BFD789F20}"/>
-          </ac:picMkLst>
-        </pc:picChg>
-        <pc:picChg chg="del">
-          <ac:chgData name="Marcia Moraes" userId="c9c67e8a-58e2-4733-9a1c-5d44fec4775b" providerId="ADAL" clId="{13EBC211-F23B-468A-BCCD-307C1181F47D}" dt="2022-08-05T00:52:25.814" v="1422" actId="478"/>
-          <ac:picMkLst>
-            <pc:docMk/>
-            <pc:sldMk cId="2458664928" sldId="289"/>
-            <ac:picMk id="4" creationId="{CCED1E14-C3F2-449C-97E3-FA15C761422B}"/>
-          </ac:picMkLst>
-        </pc:picChg>
-      </pc:sldChg>
-      <pc:sldChg chg="addSp delSp modSp add del delAnim modAnim">
-        <pc:chgData name="Marcia Moraes" userId="c9c67e8a-58e2-4733-9a1c-5d44fec4775b" providerId="ADAL" clId="{13EBC211-F23B-468A-BCCD-307C1181F47D}" dt="2022-08-05T00:14:33.107" v="841" actId="2696"/>
-        <pc:sldMkLst>
-          <pc:docMk/>
-          <pc:sldMk cId="2657288472" sldId="289"/>
-        </pc:sldMkLst>
-        <pc:spChg chg="del">
-          <ac:chgData name="Marcia Moraes" userId="c9c67e8a-58e2-4733-9a1c-5d44fec4775b" providerId="ADAL" clId="{13EBC211-F23B-468A-BCCD-307C1181F47D}" dt="2022-08-05T00:02:34.573" v="774" actId="478"/>
-          <ac:spMkLst>
-            <pc:docMk/>
-            <pc:sldMk cId="2657288472" sldId="289"/>
-            <ac:spMk id="3" creationId="{72F2DB2F-2056-42EA-BDA8-F50B02A12EBD}"/>
-          </ac:spMkLst>
-        </pc:spChg>
-        <pc:spChg chg="add del mod">
-          <ac:chgData name="Marcia Moraes" userId="c9c67e8a-58e2-4733-9a1c-5d44fec4775b" providerId="ADAL" clId="{13EBC211-F23B-468A-BCCD-307C1181F47D}" dt="2022-08-05T00:09:30.628" v="802" actId="1076"/>
-          <ac:spMkLst>
-            <pc:docMk/>
-            <pc:sldMk cId="2657288472" sldId="289"/>
-            <ac:spMk id="6" creationId="{A34D8BB4-32E1-44D0-8463-B8D8EE56AEC2}"/>
-          </ac:spMkLst>
-        </pc:spChg>
-        <pc:spChg chg="mod">
-          <ac:chgData name="Marcia Moraes" userId="c9c67e8a-58e2-4733-9a1c-5d44fec4775b" providerId="ADAL" clId="{13EBC211-F23B-468A-BCCD-307C1181F47D}" dt="2022-08-05T00:02:18.294" v="772"/>
-          <ac:spMkLst>
-            <pc:docMk/>
-            <pc:sldMk cId="2657288472" sldId="289"/>
-            <ac:spMk id="209" creationId="{00000000-0000-0000-0000-000000000000}"/>
-          </ac:spMkLst>
-        </pc:spChg>
-        <pc:spChg chg="mod">
-          <ac:chgData name="Marcia Moraes" userId="c9c67e8a-58e2-4733-9a1c-5d44fec4775b" providerId="ADAL" clId="{13EBC211-F23B-468A-BCCD-307C1181F47D}" dt="2022-08-05T00:09:38.910" v="804" actId="255"/>
-          <ac:spMkLst>
-            <pc:docMk/>
-            <pc:sldMk cId="2657288472" sldId="289"/>
-            <ac:spMk id="210" creationId="{00000000-0000-0000-0000-000000000000}"/>
-          </ac:spMkLst>
-        </pc:spChg>
-        <pc:picChg chg="del">
-          <ac:chgData name="Marcia Moraes" userId="c9c67e8a-58e2-4733-9a1c-5d44fec4775b" providerId="ADAL" clId="{13EBC211-F23B-468A-BCCD-307C1181F47D}" dt="2022-08-05T00:02:35.354" v="775" actId="478"/>
-          <ac:picMkLst>
-            <pc:docMk/>
-            <pc:sldMk cId="2657288472" sldId="289"/>
-            <ac:picMk id="2" creationId="{2575394E-99C0-4E3E-8E9E-52855CBAFC04}"/>
-          </ac:picMkLst>
-        </pc:picChg>
-      </pc:sldChg>
-      <pc:sldChg chg="addSp delSp modSp add modAnim">
-        <pc:chgData name="Marcia Moraes" userId="c9c67e8a-58e2-4733-9a1c-5d44fec4775b" providerId="ADAL" clId="{13EBC211-F23B-468A-BCCD-307C1181F47D}" dt="2022-08-05T01:05:35.711" v="1651" actId="255"/>
-        <pc:sldMkLst>
-          <pc:docMk/>
-          <pc:sldMk cId="2279721455" sldId="290"/>
-        </pc:sldMkLst>
-        <pc:spChg chg="mod">
-          <ac:chgData name="Marcia Moraes" userId="c9c67e8a-58e2-4733-9a1c-5d44fec4775b" providerId="ADAL" clId="{13EBC211-F23B-468A-BCCD-307C1181F47D}" dt="2022-08-05T01:05:17.457" v="1648" actId="1076"/>
-          <ac:spMkLst>
-            <pc:docMk/>
-            <pc:sldMk cId="2279721455" sldId="290"/>
-            <ac:spMk id="3" creationId="{72F2DB2F-2056-42EA-BDA8-F50B02A12EBD}"/>
-          </ac:spMkLst>
-        </pc:spChg>
-        <pc:spChg chg="add del mod">
-          <ac:chgData name="Marcia Moraes" userId="c9c67e8a-58e2-4733-9a1c-5d44fec4775b" providerId="ADAL" clId="{13EBC211-F23B-468A-BCCD-307C1181F47D}" dt="2022-08-05T01:01:28.275" v="1618" actId="478"/>
-          <ac:spMkLst>
-            <pc:docMk/>
-            <pc:sldMk cId="2279721455" sldId="290"/>
-            <ac:spMk id="5" creationId="{C74ADAE5-1ED5-45ED-B6C2-E1E4E649B7AF}"/>
-          </ac:spMkLst>
-        </pc:spChg>
-        <pc:spChg chg="add mod">
-          <ac:chgData name="Marcia Moraes" userId="c9c67e8a-58e2-4733-9a1c-5d44fec4775b" providerId="ADAL" clId="{13EBC211-F23B-468A-BCCD-307C1181F47D}" dt="2022-08-05T01:02:10.626" v="1628" actId="5793"/>
-          <ac:spMkLst>
-            <pc:docMk/>
-            <pc:sldMk cId="2279721455" sldId="290"/>
-            <ac:spMk id="8" creationId="{C4108BC5-512B-4F11-BDF4-A13C75682E15}"/>
-          </ac:spMkLst>
-        </pc:spChg>
-        <pc:spChg chg="mod">
-          <ac:chgData name="Marcia Moraes" userId="c9c67e8a-58e2-4733-9a1c-5d44fec4775b" providerId="ADAL" clId="{13EBC211-F23B-468A-BCCD-307C1181F47D}" dt="2022-08-05T01:05:35.711" v="1651" actId="255"/>
-          <ac:spMkLst>
-            <pc:docMk/>
-            <pc:sldMk cId="2279721455" sldId="290"/>
-            <ac:spMk id="209" creationId="{00000000-0000-0000-0000-000000000000}"/>
-          </ac:spMkLst>
-        </pc:spChg>
-        <pc:spChg chg="del">
-          <ac:chgData name="Marcia Moraes" userId="c9c67e8a-58e2-4733-9a1c-5d44fec4775b" providerId="ADAL" clId="{13EBC211-F23B-468A-BCCD-307C1181F47D}" dt="2022-08-05T01:01:27.157" v="1617" actId="478"/>
-          <ac:spMkLst>
-            <pc:docMk/>
-            <pc:sldMk cId="2279721455" sldId="290"/>
-            <ac:spMk id="210" creationId="{00000000-0000-0000-0000-000000000000}"/>
-          </ac:spMkLst>
-        </pc:spChg>
-        <pc:picChg chg="mod">
-          <ac:chgData name="Marcia Moraes" userId="c9c67e8a-58e2-4733-9a1c-5d44fec4775b" providerId="ADAL" clId="{13EBC211-F23B-468A-BCCD-307C1181F47D}" dt="2022-08-05T01:05:18.703" v="1649" actId="1076"/>
-          <ac:picMkLst>
-            <pc:docMk/>
-            <pc:sldMk cId="2279721455" sldId="290"/>
-            <ac:picMk id="2" creationId="{2575394E-99C0-4E3E-8E9E-52855CBAFC04}"/>
-          </ac:picMkLst>
-        </pc:picChg>
-      </pc:sldChg>
-      <pc:sldChg chg="addSp delSp modSp add delAnim modAnim">
-        <pc:chgData name="Marcia Moraes" userId="c9c67e8a-58e2-4733-9a1c-5d44fec4775b" providerId="ADAL" clId="{13EBC211-F23B-468A-BCCD-307C1181F47D}" dt="2022-08-05T02:29:31.343" v="1915" actId="255"/>
-        <pc:sldMkLst>
-          <pc:docMk/>
-          <pc:sldMk cId="1884779873" sldId="291"/>
-        </pc:sldMkLst>
-        <pc:spChg chg="mod">
-          <ac:chgData name="Marcia Moraes" userId="c9c67e8a-58e2-4733-9a1c-5d44fec4775b" providerId="ADAL" clId="{13EBC211-F23B-468A-BCCD-307C1181F47D}" dt="2022-08-05T02:29:31.343" v="1915" actId="255"/>
-          <ac:spMkLst>
-            <pc:docMk/>
-            <pc:sldMk cId="1884779873" sldId="291"/>
-            <ac:spMk id="2" creationId="{6302E6FC-80C8-2F4C-A9F0-9B205434775A}"/>
-          </ac:spMkLst>
-        </pc:spChg>
-        <pc:spChg chg="mod">
-          <ac:chgData name="Marcia Moraes" userId="c9c67e8a-58e2-4733-9a1c-5d44fec4775b" providerId="ADAL" clId="{13EBC211-F23B-468A-BCCD-307C1181F47D}" dt="2022-08-05T02:19:47.848" v="1845" actId="108"/>
-          <ac:spMkLst>
-            <pc:docMk/>
-            <pc:sldMk cId="1884779873" sldId="291"/>
-            <ac:spMk id="3" creationId="{93E01694-2C32-BA4D-B6F8-4BE99716E841}"/>
-          </ac:spMkLst>
-        </pc:spChg>
-        <pc:spChg chg="add del">
-          <ac:chgData name="Marcia Moraes" userId="c9c67e8a-58e2-4733-9a1c-5d44fec4775b" providerId="ADAL" clId="{13EBC211-F23B-468A-BCCD-307C1181F47D}" dt="2022-08-05T02:20:00.158" v="1848" actId="478"/>
-          <ac:spMkLst>
-            <pc:docMk/>
-            <pc:sldMk cId="1884779873" sldId="291"/>
-            <ac:spMk id="4" creationId="{0BAF17C1-0535-4228-9AAC-BA0E85A7ED59}"/>
-          </ac:spMkLst>
-        </pc:spChg>
-        <pc:spChg chg="del">
-          <ac:chgData name="Marcia Moraes" userId="c9c67e8a-58e2-4733-9a1c-5d44fec4775b" providerId="ADAL" clId="{13EBC211-F23B-468A-BCCD-307C1181F47D}" dt="2022-08-05T02:20:46.455" v="1853" actId="478"/>
-          <ac:spMkLst>
-            <pc:docMk/>
-            <pc:sldMk cId="1884779873" sldId="291"/>
-            <ac:spMk id="8" creationId="{1238E34D-3F42-431B-8299-5D95D119F363}"/>
-          </ac:spMkLst>
-        </pc:spChg>
-        <pc:spChg chg="del">
-          <ac:chgData name="Marcia Moraes" userId="c9c67e8a-58e2-4733-9a1c-5d44fec4775b" providerId="ADAL" clId="{13EBC211-F23B-468A-BCCD-307C1181F47D}" dt="2022-08-05T02:20:55.398" v="1859" actId="478"/>
-          <ac:spMkLst>
-            <pc:docMk/>
-            <pc:sldMk cId="1884779873" sldId="291"/>
-            <ac:spMk id="11" creationId="{DDABD8E9-00AF-4545-AA15-17E9BFB5604C}"/>
-          </ac:spMkLst>
-        </pc:spChg>
-        <pc:spChg chg="del">
-          <ac:chgData name="Marcia Moraes" userId="c9c67e8a-58e2-4733-9a1c-5d44fec4775b" providerId="ADAL" clId="{13EBC211-F23B-468A-BCCD-307C1181F47D}" dt="2022-08-05T02:20:56.062" v="1860" actId="478"/>
-          <ac:spMkLst>
-            <pc:docMk/>
-            <pc:sldMk cId="1884779873" sldId="291"/>
-            <ac:spMk id="14" creationId="{4E3BA20C-5A3F-48AA-8B6D-29065BC1A3F6}"/>
-          </ac:spMkLst>
-        </pc:spChg>
-        <pc:picChg chg="add mod">
-          <ac:chgData name="Marcia Moraes" userId="c9c67e8a-58e2-4733-9a1c-5d44fec4775b" providerId="ADAL" clId="{13EBC211-F23B-468A-BCCD-307C1181F47D}" dt="2022-08-05T02:27:15.950" v="1870" actId="1076"/>
-          <ac:picMkLst>
-            <pc:docMk/>
-            <pc:sldMk cId="1884779873" sldId="291"/>
-            <ac:picMk id="5" creationId="{D6A6E938-9AF6-4831-9ADA-8D7F54EDA616}"/>
-          </ac:picMkLst>
-        </pc:picChg>
-        <pc:picChg chg="del">
-          <ac:chgData name="Marcia Moraes" userId="c9c67e8a-58e2-4733-9a1c-5d44fec4775b" providerId="ADAL" clId="{13EBC211-F23B-468A-BCCD-307C1181F47D}" dt="2022-08-05T02:19:54.607" v="1846" actId="478"/>
-          <ac:picMkLst>
-            <pc:docMk/>
-            <pc:sldMk cId="1884779873" sldId="291"/>
-            <ac:picMk id="6" creationId="{46743590-FE97-4D0B-BC5B-A0C5AF0BB8CC}"/>
-          </ac:picMkLst>
-        </pc:picChg>
-        <pc:picChg chg="del">
-          <ac:chgData name="Marcia Moraes" userId="c9c67e8a-58e2-4733-9a1c-5d44fec4775b" providerId="ADAL" clId="{13EBC211-F23B-468A-BCCD-307C1181F47D}" dt="2022-08-05T02:20:02.161" v="1849" actId="478"/>
-          <ac:picMkLst>
-            <pc:docMk/>
-            <pc:sldMk cId="1884779873" sldId="291"/>
-            <ac:picMk id="7" creationId="{EB107B2F-C5E1-4A56-ABAC-F84DA3A8E1F2}"/>
-          </ac:picMkLst>
-        </pc:picChg>
-        <pc:picChg chg="del">
-          <ac:chgData name="Marcia Moraes" userId="c9c67e8a-58e2-4733-9a1c-5d44fec4775b" providerId="ADAL" clId="{13EBC211-F23B-468A-BCCD-307C1181F47D}" dt="2022-08-05T02:20:51.863" v="1855" actId="478"/>
-          <ac:picMkLst>
-            <pc:docMk/>
-            <pc:sldMk cId="1884779873" sldId="291"/>
-            <ac:picMk id="9" creationId="{EAA64842-8276-4F3A-9268-C6A8DD0F6505}"/>
-          </ac:picMkLst>
-        </pc:picChg>
-        <pc:picChg chg="del">
-          <ac:chgData name="Marcia Moraes" userId="c9c67e8a-58e2-4733-9a1c-5d44fec4775b" providerId="ADAL" clId="{13EBC211-F23B-468A-BCCD-307C1181F47D}" dt="2022-08-05T02:20:53.903" v="1857" actId="478"/>
-          <ac:picMkLst>
-            <pc:docMk/>
-            <pc:sldMk cId="1884779873" sldId="291"/>
-            <ac:picMk id="10" creationId="{B7DDFD8A-696E-4EC7-B843-1FC38A17CBB0}"/>
-          </ac:picMkLst>
-        </pc:picChg>
-        <pc:picChg chg="del">
-          <ac:chgData name="Marcia Moraes" userId="c9c67e8a-58e2-4733-9a1c-5d44fec4775b" providerId="ADAL" clId="{13EBC211-F23B-468A-BCCD-307C1181F47D}" dt="2022-08-05T02:20:52.598" v="1856" actId="478"/>
-          <ac:picMkLst>
-            <pc:docMk/>
-            <pc:sldMk cId="1884779873" sldId="291"/>
-            <ac:picMk id="12" creationId="{91377548-5B56-43CC-83B0-9769454EA229}"/>
-          </ac:picMkLst>
-        </pc:picChg>
-        <pc:picChg chg="del">
-          <ac:chgData name="Marcia Moraes" userId="c9c67e8a-58e2-4733-9a1c-5d44fec4775b" providerId="ADAL" clId="{13EBC211-F23B-468A-BCCD-307C1181F47D}" dt="2022-08-05T02:20:54.720" v="1858" actId="478"/>
-          <ac:picMkLst>
-            <pc:docMk/>
-            <pc:sldMk cId="1884779873" sldId="291"/>
-            <ac:picMk id="13" creationId="{1C23C1DF-3F5D-4468-9FD3-05B1B93C7ED6}"/>
-          </ac:picMkLst>
-        </pc:picChg>
-        <pc:picChg chg="add mod">
-          <ac:chgData name="Marcia Moraes" userId="c9c67e8a-58e2-4733-9a1c-5d44fec4775b" providerId="ADAL" clId="{13EBC211-F23B-468A-BCCD-307C1181F47D}" dt="2022-08-05T02:27:10.332" v="1868" actId="1076"/>
-          <ac:picMkLst>
-            <pc:docMk/>
-            <pc:sldMk cId="1884779873" sldId="291"/>
-            <ac:picMk id="15" creationId="{50CE98DC-4137-4EBC-A825-64A7CDC9A01C}"/>
-          </ac:picMkLst>
-        </pc:picChg>
-        <pc:picChg chg="add del">
-          <ac:chgData name="Marcia Moraes" userId="c9c67e8a-58e2-4733-9a1c-5d44fec4775b" providerId="ADAL" clId="{13EBC211-F23B-468A-BCCD-307C1181F47D}" dt="2022-08-05T02:25:46.415" v="1865"/>
-          <ac:picMkLst>
-            <pc:docMk/>
-            <pc:sldMk cId="1884779873" sldId="291"/>
-            <ac:picMk id="16" creationId="{26A1C3C9-594D-473E-B42D-C9A6CAA8EEF3}"/>
-          </ac:picMkLst>
-        </pc:picChg>
-        <pc:picChg chg="add del mod">
-          <ac:chgData name="Marcia Moraes" userId="c9c67e8a-58e2-4733-9a1c-5d44fec4775b" providerId="ADAL" clId="{13EBC211-F23B-468A-BCCD-307C1181F47D}" dt="2022-08-05T02:28:11.695" v="1871" actId="478"/>
-          <ac:picMkLst>
-            <pc:docMk/>
-            <pc:sldMk cId="1884779873" sldId="291"/>
-            <ac:picMk id="17" creationId="{B68AD5DA-A338-41D4-9C23-7D7DBFBBDE94}"/>
-          </ac:picMkLst>
-        </pc:picChg>
-        <pc:picChg chg="add mod">
-          <ac:chgData name="Marcia Moraes" userId="c9c67e8a-58e2-4733-9a1c-5d44fec4775b" providerId="ADAL" clId="{13EBC211-F23B-468A-BCCD-307C1181F47D}" dt="2022-08-05T02:28:32.915" v="1873" actId="1076"/>
-          <ac:picMkLst>
-            <pc:docMk/>
-            <pc:sldMk cId="1884779873" sldId="291"/>
-            <ac:picMk id="18" creationId="{8DBDEE2C-AAD4-4368-A8F1-3252C018802B}"/>
-          </ac:picMkLst>
-        </pc:picChg>
-      </pc:sldChg>
-      <pc:sldChg chg="modSp add">
-        <pc:chgData name="Marcia Moraes" userId="c9c67e8a-58e2-4733-9a1c-5d44fec4775b" providerId="ADAL" clId="{13EBC211-F23B-468A-BCCD-307C1181F47D}" dt="2022-08-05T02:40:16.720" v="2660" actId="20577"/>
-        <pc:sldMkLst>
-          <pc:docMk/>
-          <pc:sldMk cId="1549212594" sldId="292"/>
-        </pc:sldMkLst>
-        <pc:spChg chg="mod">
-          <ac:chgData name="Marcia Moraes" userId="c9c67e8a-58e2-4733-9a1c-5d44fec4775b" providerId="ADAL" clId="{13EBC211-F23B-468A-BCCD-307C1181F47D}" dt="2022-08-05T02:40:09.298" v="2658" actId="20577"/>
-          <ac:spMkLst>
-            <pc:docMk/>
-            <pc:sldMk cId="1549212594" sldId="292"/>
-            <ac:spMk id="3" creationId="{401F1007-2C43-4BFF-8517-F9FEEBF1B349}"/>
-          </ac:spMkLst>
-        </pc:spChg>
-        <pc:spChg chg="mod">
-          <ac:chgData name="Marcia Moraes" userId="c9c67e8a-58e2-4733-9a1c-5d44fec4775b" providerId="ADAL" clId="{13EBC211-F23B-468A-BCCD-307C1181F47D}" dt="2022-08-05T02:40:16.720" v="2660" actId="20577"/>
-          <ac:spMkLst>
-            <pc:docMk/>
-            <pc:sldMk cId="1549212594" sldId="292"/>
-            <ac:spMk id="223" creationId="{00000000-0000-0000-0000-000000000000}"/>
-          </ac:spMkLst>
-        </pc:spChg>
-      </pc:sldChg>
-      <pc:sldMasterChg chg="delSldLayout">
-        <pc:chgData name="Marcia Moraes" userId="c9c67e8a-58e2-4733-9a1c-5d44fec4775b" providerId="ADAL" clId="{13EBC211-F23B-468A-BCCD-307C1181F47D}" dt="2022-08-05T00:14:34.383" v="843" actId="2696"/>
-        <pc:sldMasterMkLst>
-          <pc:docMk/>
-          <pc:sldMasterMk cId="0" sldId="2147483685"/>
-        </pc:sldMasterMkLst>
-        <pc:sldLayoutChg chg="del">
-          <pc:chgData name="Marcia Moraes" userId="c9c67e8a-58e2-4733-9a1c-5d44fec4775b" providerId="ADAL" clId="{13EBC211-F23B-468A-BCCD-307C1181F47D}" dt="2022-08-04T22:47:24.212" v="3" actId="2696"/>
-          <pc:sldLayoutMkLst>
-            <pc:docMk/>
-            <pc:sldMasterMk cId="0" sldId="2147483685"/>
-            <pc:sldLayoutMk cId="0" sldId="2147483670"/>
-          </pc:sldLayoutMkLst>
-        </pc:sldLayoutChg>
-        <pc:sldLayoutChg chg="del">
-          <pc:chgData name="Marcia Moraes" userId="c9c67e8a-58e2-4733-9a1c-5d44fec4775b" providerId="ADAL" clId="{13EBC211-F23B-468A-BCCD-307C1181F47D}" dt="2022-08-05T00:14:34.383" v="843" actId="2696"/>
-          <pc:sldLayoutMkLst>
-            <pc:docMk/>
-            <pc:sldMasterMk cId="0" sldId="2147483685"/>
-            <pc:sldLayoutMk cId="2926822573" sldId="2147483711"/>
-          </pc:sldLayoutMkLst>
-        </pc:sldLayoutChg>
-      </pc:sldMasterChg>
     </pc:docChg>
   </pc:docChgLst>
 </pc:chgInfo>
@@ -21588,7 +20652,7 @@
             <a:pPr lvl="1"/>
             <a:r>
               <a:rPr lang="en-US" sz="1600" dirty="0"/>
-              <a:t>Unlike Explicit/Strongly Typed Languages (java) </a:t>
+              <a:t>Unlike Explicit/Strongly Typed Languages (Java) </a:t>
             </a:r>
           </a:p>
           <a:p>
@@ -25772,15 +24836,6 @@
 </file>
 
 <file path=customXml/item1.xml><?xml version="1.0" encoding="utf-8"?>
-<?mso-contentType ?>
-<FormTemplates xmlns="http://schemas.microsoft.com/sharepoint/v3/contenttype/forms">
-  <Display>DocumentLibraryForm</Display>
-  <Edit>DocumentLibraryForm</Edit>
-  <New>DocumentLibraryForm</New>
-</FormTemplates>
-</file>
-
-<file path=customXml/item2.xml><?xml version="1.0" encoding="utf-8"?>
 <ct:contentTypeSchema xmlns:ct="http://schemas.microsoft.com/office/2006/metadata/contentType" xmlns:ma="http://schemas.microsoft.com/office/2006/metadata/properties/metaAttributes" ct:_="" ma:_="" ma:contentTypeName="Document" ma:contentTypeID="0x010100074387D78AC76C4289401EF66FB51FCC" ma:contentTypeVersion="14" ma:contentTypeDescription="Create a new document." ma:contentTypeScope="" ma:versionID="16aa88660fc2fdca5573e381835fe0c9">
   <xsd:schema xmlns:xsd="http://www.w3.org/2001/XMLSchema" xmlns:xs="http://www.w3.org/2001/XMLSchema" xmlns:p="http://schemas.microsoft.com/office/2006/metadata/properties" xmlns:ns3="92c41bee-f0ee-4aa6-9399-a35fbb883510" xmlns:ns4="e06ed288-fd75-4b50-bbed-f5a5df88c31c" targetNamespace="http://schemas.microsoft.com/office/2006/metadata/properties" ma:root="true" ma:fieldsID="d08ce21c39dd96af8dcee1a6fd74aaf6" ns3:_="" ns4:_="">
     <xsd:import namespace="92c41bee-f0ee-4aa6-9399-a35fbb883510"/>
@@ -26009,6 +25064,15 @@
 </ct:contentTypeSchema>
 </file>
 
+<file path=customXml/item2.xml><?xml version="1.0" encoding="utf-8"?>
+<?mso-contentType ?>
+<FormTemplates xmlns="http://schemas.microsoft.com/sharepoint/v3/contenttype/forms">
+  <Display>DocumentLibraryForm</Display>
+  <Edit>DocumentLibraryForm</Edit>
+  <New>DocumentLibraryForm</New>
+</FormTemplates>
+</file>
+
 <file path=customXml/item3.xml><?xml version="1.0" encoding="utf-8"?>
 <p:properties xmlns:p="http://schemas.microsoft.com/office/2006/metadata/properties" xmlns:xsi="http://www.w3.org/2001/XMLSchema-instance" xmlns:pc="http://schemas.microsoft.com/office/infopath/2007/PartnerControls">
   <documentManagement/>
@@ -26016,14 +25080,6 @@
 </file>
 
 <file path=customXml/itemProps1.xml><?xml version="1.0" encoding="utf-8"?>
-<ds:datastoreItem xmlns:ds="http://schemas.openxmlformats.org/officeDocument/2006/customXml" ds:itemID="{ECBA097B-6123-4B8A-8BF9-8745C25437D5}">
-  <ds:schemaRefs>
-    <ds:schemaRef ds:uri="http://schemas.microsoft.com/sharepoint/v3/contenttype/forms"/>
-  </ds:schemaRefs>
-</ds:datastoreItem>
-</file>
-
-<file path=customXml/itemProps2.xml><?xml version="1.0" encoding="utf-8"?>
 <ds:datastoreItem xmlns:ds="http://schemas.openxmlformats.org/officeDocument/2006/customXml" ds:itemID="{ECE8EA35-9C42-4825-ABC6-2C345E857976}">
   <ds:schemaRefs>
     <ds:schemaRef ds:uri="http://schemas.microsoft.com/office/2006/metadata/contentType"/>
@@ -26042,19 +25098,27 @@
 </ds:datastoreItem>
 </file>
 
+<file path=customXml/itemProps2.xml><?xml version="1.0" encoding="utf-8"?>
+<ds:datastoreItem xmlns:ds="http://schemas.openxmlformats.org/officeDocument/2006/customXml" ds:itemID="{ECBA097B-6123-4B8A-8BF9-8745C25437D5}">
+  <ds:schemaRefs>
+    <ds:schemaRef ds:uri="http://schemas.microsoft.com/sharepoint/v3/contenttype/forms"/>
+  </ds:schemaRefs>
+</ds:datastoreItem>
+</file>
+
 <file path=customXml/itemProps3.xml><?xml version="1.0" encoding="utf-8"?>
 <ds:datastoreItem xmlns:ds="http://schemas.openxmlformats.org/officeDocument/2006/customXml" ds:itemID="{05D3EE4C-68D3-4BA3-94E6-383E2DFDD168}">
   <ds:schemaRefs>
+    <ds:schemaRef ds:uri="http://purl.org/dc/dcmitype/"/>
+    <ds:schemaRef ds:uri="http://purl.org/dc/terms/"/>
     <ds:schemaRef ds:uri="http://schemas.openxmlformats.org/package/2006/metadata/core-properties"/>
-    <ds:schemaRef ds:uri="http://schemas.microsoft.com/office/2006/metadata/properties"/>
-    <ds:schemaRef ds:uri="http://purl.org/dc/terms/"/>
-    <ds:schemaRef ds:uri="http://www.w3.org/XML/1998/namespace"/>
+    <ds:schemaRef ds:uri="92c41bee-f0ee-4aa6-9399-a35fbb883510"/>
     <ds:schemaRef ds:uri="http://schemas.microsoft.com/office/2006/documentManagement/types"/>
     <ds:schemaRef ds:uri="http://purl.org/dc/elements/1.1/"/>
-    <ds:schemaRef ds:uri="http://purl.org/dc/dcmitype/"/>
-    <ds:schemaRef ds:uri="92c41bee-f0ee-4aa6-9399-a35fbb883510"/>
     <ds:schemaRef ds:uri="http://schemas.microsoft.com/office/infopath/2007/PartnerControls"/>
     <ds:schemaRef ds:uri="e06ed288-fd75-4b50-bbed-f5a5df88c31c"/>
+    <ds:schemaRef ds:uri="http://schemas.microsoft.com/office/2006/metadata/properties"/>
+    <ds:schemaRef ds:uri="http://www.w3.org/XML/1998/namespace"/>
   </ds:schemaRefs>
 </ds:datastoreItem>
 </file>
</xml_diff>